<commit_message>
Create and edit figures for paper
</commit_message>
<xml_diff>
--- a/Figures/Arcs/Architecture_DeterParam.pptx
+++ b/Figures/Arcs/Architecture_DeterParam.pptx
@@ -259,7 +259,7 @@
           <a:p>
             <a:fld id="{F10AD0CF-67A3-9C41-B19A-F5AA529395DE}" type="datetimeFigureOut">
               <a:rPr lang="en-US" smtClean="0"/>
-              <a:t>8/21/23</a:t>
+              <a:t>8/30/23</a:t>
             </a:fld>
             <a:endParaRPr lang="en-US"/>
           </a:p>
@@ -457,7 +457,7 @@
           <a:p>
             <a:fld id="{F10AD0CF-67A3-9C41-B19A-F5AA529395DE}" type="datetimeFigureOut">
               <a:rPr lang="en-US" smtClean="0"/>
-              <a:t>8/21/23</a:t>
+              <a:t>8/30/23</a:t>
             </a:fld>
             <a:endParaRPr lang="en-US"/>
           </a:p>
@@ -665,7 +665,7 @@
           <a:p>
             <a:fld id="{F10AD0CF-67A3-9C41-B19A-F5AA529395DE}" type="datetimeFigureOut">
               <a:rPr lang="en-US" smtClean="0"/>
-              <a:t>8/21/23</a:t>
+              <a:t>8/30/23</a:t>
             </a:fld>
             <a:endParaRPr lang="en-US"/>
           </a:p>
@@ -863,7 +863,7 @@
           <a:p>
             <a:fld id="{F10AD0CF-67A3-9C41-B19A-F5AA529395DE}" type="datetimeFigureOut">
               <a:rPr lang="en-US" smtClean="0"/>
-              <a:t>8/21/23</a:t>
+              <a:t>8/30/23</a:t>
             </a:fld>
             <a:endParaRPr lang="en-US"/>
           </a:p>
@@ -1138,7 +1138,7 @@
           <a:p>
             <a:fld id="{F10AD0CF-67A3-9C41-B19A-F5AA529395DE}" type="datetimeFigureOut">
               <a:rPr lang="en-US" smtClean="0"/>
-              <a:t>8/21/23</a:t>
+              <a:t>8/30/23</a:t>
             </a:fld>
             <a:endParaRPr lang="en-US"/>
           </a:p>
@@ -1403,7 +1403,7 @@
           <a:p>
             <a:fld id="{F10AD0CF-67A3-9C41-B19A-F5AA529395DE}" type="datetimeFigureOut">
               <a:rPr lang="en-US" smtClean="0"/>
-              <a:t>8/21/23</a:t>
+              <a:t>8/30/23</a:t>
             </a:fld>
             <a:endParaRPr lang="en-US"/>
           </a:p>
@@ -1815,7 +1815,7 @@
           <a:p>
             <a:fld id="{F10AD0CF-67A3-9C41-B19A-F5AA529395DE}" type="datetimeFigureOut">
               <a:rPr lang="en-US" smtClean="0"/>
-              <a:t>8/21/23</a:t>
+              <a:t>8/30/23</a:t>
             </a:fld>
             <a:endParaRPr lang="en-US"/>
           </a:p>
@@ -1956,7 +1956,7 @@
           <a:p>
             <a:fld id="{F10AD0CF-67A3-9C41-B19A-F5AA529395DE}" type="datetimeFigureOut">
               <a:rPr lang="en-US" smtClean="0"/>
-              <a:t>8/21/23</a:t>
+              <a:t>8/30/23</a:t>
             </a:fld>
             <a:endParaRPr lang="en-US"/>
           </a:p>
@@ -2069,7 +2069,7 @@
           <a:p>
             <a:fld id="{F10AD0CF-67A3-9C41-B19A-F5AA529395DE}" type="datetimeFigureOut">
               <a:rPr lang="en-US" smtClean="0"/>
-              <a:t>8/21/23</a:t>
+              <a:t>8/30/23</a:t>
             </a:fld>
             <a:endParaRPr lang="en-US"/>
           </a:p>
@@ -2380,7 +2380,7 @@
           <a:p>
             <a:fld id="{F10AD0CF-67A3-9C41-B19A-F5AA529395DE}" type="datetimeFigureOut">
               <a:rPr lang="en-US" smtClean="0"/>
-              <a:t>8/21/23</a:t>
+              <a:t>8/30/23</a:t>
             </a:fld>
             <a:endParaRPr lang="en-US"/>
           </a:p>
@@ -2668,7 +2668,7 @@
           <a:p>
             <a:fld id="{F10AD0CF-67A3-9C41-B19A-F5AA529395DE}" type="datetimeFigureOut">
               <a:rPr lang="en-US" smtClean="0"/>
-              <a:t>8/21/23</a:t>
+              <a:t>8/30/23</a:t>
             </a:fld>
             <a:endParaRPr lang="en-US"/>
           </a:p>
@@ -2909,7 +2909,7 @@
           <a:p>
             <a:fld id="{F10AD0CF-67A3-9C41-B19A-F5AA529395DE}" type="datetimeFigureOut">
               <a:rPr lang="en-US" smtClean="0"/>
-              <a:t>8/21/23</a:t>
+              <a:t>8/30/23</a:t>
             </a:fld>
             <a:endParaRPr lang="en-US"/>
           </a:p>
@@ -3328,182 +3328,6 @@
       </p:grpSpPr>
       <p:sp>
         <p:nvSpPr>
-          <p:cNvPr id="4" name="Card 3">
-            <a:extLst>
-              <a:ext uri="{FF2B5EF4-FFF2-40B4-BE49-F238E27FC236}">
-                <a16:creationId xmlns:a16="http://schemas.microsoft.com/office/drawing/2014/main" id="{CCB07E2C-7B92-FCDD-27C3-A06990AEFCF0}"/>
-              </a:ext>
-            </a:extLst>
-          </p:cNvPr>
-          <p:cNvSpPr/>
-          <p:nvPr/>
-        </p:nvSpPr>
-        <p:spPr>
-          <a:xfrm flipH="1">
-            <a:off x="3063184" y="2511259"/>
-            <a:ext cx="2738905" cy="516165"/>
-          </a:xfrm>
-          <a:prstGeom prst="flowChartPunchedCard">
-            <a:avLst/>
-          </a:prstGeom>
-          <a:solidFill>
-            <a:schemeClr val="bg1"/>
-          </a:solidFill>
-          <a:ln w="41275">
-            <a:solidFill>
-              <a:schemeClr val="tx1"/>
-            </a:solidFill>
-          </a:ln>
-          <a:effectLst/>
-        </p:spPr>
-        <p:style>
-          <a:lnRef idx="1">
-            <a:schemeClr val="accent1"/>
-          </a:lnRef>
-          <a:fillRef idx="3">
-            <a:schemeClr val="accent1"/>
-          </a:fillRef>
-          <a:effectRef idx="2">
-            <a:schemeClr val="accent1"/>
-          </a:effectRef>
-          <a:fontRef idx="minor">
-            <a:schemeClr val="lt1"/>
-          </a:fontRef>
-        </p:style>
-        <p:txBody>
-          <a:bodyPr rtlCol="0" anchor="ctr"/>
-          <a:lstStyle/>
-          <a:p>
-            <a:pPr algn="ctr"/>
-            <a:r>
-              <a:rPr lang="en-US" sz="2000" dirty="0">
-                <a:solidFill>
-                  <a:schemeClr val="tx1"/>
-                </a:solidFill>
-              </a:rPr>
-              <a:t>Original Implementation</a:t>
-            </a:r>
-          </a:p>
-        </p:txBody>
-      </p:sp>
-      <p:sp>
-        <p:nvSpPr>
-          <p:cNvPr id="5" name="Rectangle 4">
-            <a:extLst>
-              <a:ext uri="{FF2B5EF4-FFF2-40B4-BE49-F238E27FC236}">
-                <a16:creationId xmlns:a16="http://schemas.microsoft.com/office/drawing/2014/main" id="{587308D5-5376-9727-88EA-5D414F0B4136}"/>
-              </a:ext>
-            </a:extLst>
-          </p:cNvPr>
-          <p:cNvSpPr/>
-          <p:nvPr/>
-        </p:nvSpPr>
-        <p:spPr>
-          <a:xfrm>
-            <a:off x="3063185" y="1710558"/>
-            <a:ext cx="2738906" cy="690720"/>
-          </a:xfrm>
-          <a:prstGeom prst="rect">
-            <a:avLst/>
-          </a:prstGeom>
-          <a:noFill/>
-        </p:spPr>
-        <p:style>
-          <a:lnRef idx="2">
-            <a:schemeClr val="dk1"/>
-          </a:lnRef>
-          <a:fillRef idx="1">
-            <a:schemeClr val="lt1"/>
-          </a:fillRef>
-          <a:effectRef idx="0">
-            <a:schemeClr val="dk1"/>
-          </a:effectRef>
-          <a:fontRef idx="minor">
-            <a:schemeClr val="dk1"/>
-          </a:fontRef>
-        </p:style>
-        <p:txBody>
-          <a:bodyPr rtlCol="0" anchor="ctr"/>
-          <a:lstStyle/>
-          <a:p>
-            <a:pPr algn="ctr"/>
-            <a:r>
-              <a:rPr lang="en-US" sz="1600" dirty="0"/>
-              <a:t>Parameters</a:t>
-            </a:r>
-          </a:p>
-          <a:p>
-            <a:pPr algn="ctr"/>
-            <a:r>
-              <a:rPr lang="en-US" sz="1600" dirty="0"/>
-              <a:t>[…, </a:t>
-            </a:r>
-            <a:r>
-              <a:rPr lang="en-US" sz="1600" b="1" dirty="0" err="1"/>
-              <a:t>algorithm:ball_tree</a:t>
-            </a:r>
-            <a:r>
-              <a:rPr lang="en-US" sz="1600" dirty="0"/>
-              <a:t>, …]</a:t>
-            </a:r>
-            <a:endParaRPr lang="en-US" dirty="0"/>
-          </a:p>
-        </p:txBody>
-      </p:sp>
-      <p:sp>
-        <p:nvSpPr>
-          <p:cNvPr id="6" name="Rounded Rectangle 5">
-            <a:extLst>
-              <a:ext uri="{FF2B5EF4-FFF2-40B4-BE49-F238E27FC236}">
-                <a16:creationId xmlns:a16="http://schemas.microsoft.com/office/drawing/2014/main" id="{B30A22CF-B2F3-A0DE-1B51-523CEA227094}"/>
-              </a:ext>
-            </a:extLst>
-          </p:cNvPr>
-          <p:cNvSpPr/>
-          <p:nvPr/>
-        </p:nvSpPr>
-        <p:spPr>
-          <a:xfrm>
-            <a:off x="2844594" y="1601226"/>
-            <a:ext cx="3087279" cy="1557208"/>
-          </a:xfrm>
-          <a:prstGeom prst="roundRect">
-            <a:avLst/>
-          </a:prstGeom>
-          <a:noFill/>
-          <a:ln w="38100">
-            <a:solidFill>
-              <a:schemeClr val="tx1"/>
-            </a:solidFill>
-          </a:ln>
-        </p:spPr>
-        <p:style>
-          <a:lnRef idx="2">
-            <a:schemeClr val="accent1">
-              <a:shade val="15000"/>
-            </a:schemeClr>
-          </a:lnRef>
-          <a:fillRef idx="1">
-            <a:schemeClr val="accent1"/>
-          </a:fillRef>
-          <a:effectRef idx="0">
-            <a:schemeClr val="accent1"/>
-          </a:effectRef>
-          <a:fontRef idx="minor">
-            <a:schemeClr val="lt1"/>
-          </a:fontRef>
-        </p:style>
-        <p:txBody>
-          <a:bodyPr rtlCol="0" anchor="ctr"/>
-          <a:lstStyle/>
-          <a:p>
-            <a:pPr algn="ctr"/>
-            <a:endParaRPr lang="en-US"/>
-          </a:p>
-        </p:txBody>
-      </p:sp>
-      <p:sp>
-        <p:nvSpPr>
           <p:cNvPr id="29" name="Can 28">
             <a:extLst>
               <a:ext uri="{FF2B5EF4-FFF2-40B4-BE49-F238E27FC236}">
@@ -3573,7 +3397,7 @@
         </p:nvSpPr>
         <p:spPr>
           <a:xfrm>
-            <a:off x="1892750" y="2907199"/>
+            <a:off x="1533997" y="2651091"/>
             <a:ext cx="510139" cy="369332"/>
           </a:xfrm>
           <a:prstGeom prst="rect">
@@ -3671,7 +3495,7 @@
         </p:nvSpPr>
         <p:spPr>
           <a:xfrm>
-            <a:off x="1892750" y="5251474"/>
+            <a:off x="1533997" y="5002998"/>
             <a:ext cx="510139" cy="369332"/>
           </a:xfrm>
           <a:prstGeom prst="rect">
@@ -3816,8 +3640,8 @@
         </p:nvSpPr>
         <p:spPr>
           <a:xfrm flipH="1">
-            <a:off x="3063184" y="3247133"/>
-            <a:ext cx="2738905" cy="516165"/>
+            <a:off x="2871160" y="3247133"/>
+            <a:ext cx="2319944" cy="516165"/>
           </a:xfrm>
           <a:prstGeom prst="flowChartPunchedCard">
             <a:avLst/>
@@ -3881,8 +3705,8 @@
         </p:nvSpPr>
         <p:spPr>
           <a:xfrm flipH="1">
-            <a:off x="3060389" y="4788965"/>
-            <a:ext cx="2741700" cy="516165"/>
+            <a:off x="2853941" y="3937457"/>
+            <a:ext cx="2319943" cy="1443821"/>
           </a:xfrm>
           <a:prstGeom prst="flowChartPunchedCard">
             <a:avLst/>
@@ -3922,7 +3746,45 @@
                   <a:schemeClr val="tx1"/>
                 </a:solidFill>
               </a:rPr>
-              <a:t>Original Implementation</a:t>
+              <a:t>Original </a:t>
+            </a:r>
+          </a:p>
+          <a:p>
+            <a:pPr algn="ctr"/>
+            <a:r>
+              <a:rPr lang="en-US" sz="2000" dirty="0">
+                <a:solidFill>
+                  <a:schemeClr val="tx1"/>
+                </a:solidFill>
+              </a:rPr>
+              <a:t> Implementation</a:t>
+            </a:r>
+          </a:p>
+          <a:p>
+            <a:pPr algn="ctr"/>
+            <a:r>
+              <a:rPr lang="en-US" sz="1600" dirty="0">
+                <a:solidFill>
+                  <a:schemeClr val="tx1"/>
+                </a:solidFill>
+              </a:rPr>
+              <a:t>Parameters: […, </a:t>
+            </a:r>
+            <a:r>
+              <a:rPr lang="en-US" sz="1600" b="1" dirty="0" err="1">
+                <a:solidFill>
+                  <a:schemeClr val="tx1"/>
+                </a:solidFill>
+              </a:rPr>
+              <a:t>algorithm:kd_tree</a:t>
+            </a:r>
+            <a:r>
+              <a:rPr lang="en-US" sz="1600" dirty="0">
+                <a:solidFill>
+                  <a:schemeClr val="tx1"/>
+                </a:solidFill>
+              </a:rPr>
+              <a:t>, …]</a:t>
             </a:r>
           </a:p>
           <a:p>
@@ -3937,10 +3799,10 @@
       </p:sp>
       <p:sp>
         <p:nvSpPr>
-          <p:cNvPr id="67" name="Rectangle 66">
-            <a:extLst>
-              <a:ext uri="{FF2B5EF4-FFF2-40B4-BE49-F238E27FC236}">
-                <a16:creationId xmlns:a16="http://schemas.microsoft.com/office/drawing/2014/main" id="{7476D545-8C80-76AD-2725-C2E54C344FF2}"/>
+          <p:cNvPr id="69" name="Card 68">
+            <a:extLst>
+              <a:ext uri="{FF2B5EF4-FFF2-40B4-BE49-F238E27FC236}">
+                <a16:creationId xmlns:a16="http://schemas.microsoft.com/office/drawing/2014/main" id="{DE6E25A4-7CC6-609E-009A-0199A5EE53B8}"/>
               </a:ext>
             </a:extLst>
           </p:cNvPr>
@@ -3948,124 +3810,9 @@
           <p:nvPr/>
         </p:nvSpPr>
         <p:spPr>
-          <a:xfrm>
-            <a:off x="3060389" y="3988264"/>
-            <a:ext cx="2741701" cy="690720"/>
-          </a:xfrm>
-          <a:prstGeom prst="rect">
-            <a:avLst/>
-          </a:prstGeom>
-          <a:noFill/>
-        </p:spPr>
-        <p:style>
-          <a:lnRef idx="2">
-            <a:schemeClr val="dk1"/>
-          </a:lnRef>
-          <a:fillRef idx="1">
-            <a:schemeClr val="lt1"/>
-          </a:fillRef>
-          <a:effectRef idx="0">
-            <a:schemeClr val="dk1"/>
-          </a:effectRef>
-          <a:fontRef idx="minor">
-            <a:schemeClr val="dk1"/>
-          </a:fontRef>
-        </p:style>
-        <p:txBody>
-          <a:bodyPr rtlCol="0" anchor="ctr"/>
-          <a:lstStyle/>
-          <a:p>
-            <a:pPr algn="ctr"/>
-            <a:r>
-              <a:rPr lang="en-US" sz="1600" dirty="0"/>
-              <a:t>Parameters</a:t>
-            </a:r>
-          </a:p>
-          <a:p>
-            <a:pPr algn="ctr"/>
-            <a:r>
-              <a:rPr lang="en-US" sz="1600" dirty="0"/>
-              <a:t>[…, </a:t>
-            </a:r>
-            <a:r>
-              <a:rPr lang="en-US" sz="1600" b="1" dirty="0" err="1"/>
-              <a:t>algorithm:kd_tree</a:t>
-            </a:r>
-            <a:r>
-              <a:rPr lang="en-US" sz="1600" dirty="0"/>
-              <a:t>, …]</a:t>
-            </a:r>
-          </a:p>
-        </p:txBody>
-      </p:sp>
-      <p:sp>
-        <p:nvSpPr>
-          <p:cNvPr id="68" name="Rounded Rectangle 67">
-            <a:extLst>
-              <a:ext uri="{FF2B5EF4-FFF2-40B4-BE49-F238E27FC236}">
-                <a16:creationId xmlns:a16="http://schemas.microsoft.com/office/drawing/2014/main" id="{BB46B486-E9E1-07C8-8725-9995654DFC81}"/>
-              </a:ext>
-            </a:extLst>
-          </p:cNvPr>
-          <p:cNvSpPr/>
-          <p:nvPr/>
-        </p:nvSpPr>
-        <p:spPr>
-          <a:xfrm>
-            <a:off x="2844594" y="3878932"/>
-            <a:ext cx="3087279" cy="1557208"/>
-          </a:xfrm>
-          <a:prstGeom prst="roundRect">
-            <a:avLst/>
-          </a:prstGeom>
-          <a:noFill/>
-          <a:ln w="38100">
-            <a:solidFill>
-              <a:schemeClr val="tx1"/>
-            </a:solidFill>
-          </a:ln>
-        </p:spPr>
-        <p:style>
-          <a:lnRef idx="2">
-            <a:schemeClr val="accent1">
-              <a:shade val="15000"/>
-            </a:schemeClr>
-          </a:lnRef>
-          <a:fillRef idx="1">
-            <a:schemeClr val="accent1"/>
-          </a:fillRef>
-          <a:effectRef idx="0">
-            <a:schemeClr val="accent1"/>
-          </a:effectRef>
-          <a:fontRef idx="minor">
-            <a:schemeClr val="lt1"/>
-          </a:fontRef>
-        </p:style>
-        <p:txBody>
-          <a:bodyPr rtlCol="0" anchor="ctr"/>
-          <a:lstStyle/>
-          <a:p>
-            <a:pPr algn="ctr"/>
-            <a:endParaRPr lang="en-US"/>
-          </a:p>
-        </p:txBody>
-      </p:sp>
-      <p:sp>
-        <p:nvSpPr>
-          <p:cNvPr id="69" name="Card 68">
-            <a:extLst>
-              <a:ext uri="{FF2B5EF4-FFF2-40B4-BE49-F238E27FC236}">
-                <a16:creationId xmlns:a16="http://schemas.microsoft.com/office/drawing/2014/main" id="{DE6E25A4-7CC6-609E-009A-0199A5EE53B8}"/>
-              </a:ext>
-            </a:extLst>
-          </p:cNvPr>
-          <p:cNvSpPr/>
-          <p:nvPr/>
-        </p:nvSpPr>
-        <p:spPr>
           <a:xfrm flipH="1">
-            <a:off x="3182453" y="5524839"/>
-            <a:ext cx="2619636" cy="516165"/>
+            <a:off x="2853941" y="5524839"/>
+            <a:ext cx="2337164" cy="516165"/>
           </a:xfrm>
           <a:prstGeom prst="flowChartPunchedCard">
             <a:avLst/>
@@ -4117,10 +3864,10 @@
       </p:sp>
       <p:sp>
         <p:nvSpPr>
-          <p:cNvPr id="87" name="Decision 86">
-            <a:extLst>
-              <a:ext uri="{FF2B5EF4-FFF2-40B4-BE49-F238E27FC236}">
-                <a16:creationId xmlns:a16="http://schemas.microsoft.com/office/drawing/2014/main" id="{66396C0A-94E2-0398-DE38-81292A8DD427}"/>
+          <p:cNvPr id="114" name="Rectangle 113">
+            <a:extLst>
+              <a:ext uri="{FF2B5EF4-FFF2-40B4-BE49-F238E27FC236}">
+                <a16:creationId xmlns:a16="http://schemas.microsoft.com/office/drawing/2014/main" id="{A78A02CD-9247-091A-D7DF-959E74D540A7}"/>
               </a:ext>
             </a:extLst>
           </p:cNvPr>
@@ -4129,89 +3876,8 @@
         </p:nvSpPr>
         <p:spPr>
           <a:xfrm>
-            <a:off x="6592168" y="2631891"/>
-            <a:ext cx="1878298" cy="615751"/>
-          </a:xfrm>
-          <a:prstGeom prst="flowChartDecision">
-            <a:avLst/>
-          </a:prstGeom>
-          <a:ln w="38100"/>
-        </p:spPr>
-        <p:style>
-          <a:lnRef idx="2">
-            <a:schemeClr val="dk1"/>
-          </a:lnRef>
-          <a:fillRef idx="1">
-            <a:schemeClr val="lt1"/>
-          </a:fillRef>
-          <a:effectRef idx="0">
-            <a:schemeClr val="dk1"/>
-          </a:effectRef>
-          <a:fontRef idx="minor">
-            <a:schemeClr val="dk1"/>
-          </a:fontRef>
-        </p:style>
-        <p:txBody>
-          <a:bodyPr rtlCol="0" anchor="ctr"/>
-          <a:lstStyle/>
-          <a:p>
-            <a:pPr algn="ctr"/>
-            <a:endParaRPr lang="en-US" sz="1200" dirty="0"/>
-          </a:p>
-        </p:txBody>
-      </p:sp>
-      <p:sp>
-        <p:nvSpPr>
-          <p:cNvPr id="96" name="TextBox 95">
-            <a:extLst>
-              <a:ext uri="{FF2B5EF4-FFF2-40B4-BE49-F238E27FC236}">
-                <a16:creationId xmlns:a16="http://schemas.microsoft.com/office/drawing/2014/main" id="{5F03A713-DFD2-B9F7-1CB6-08B8B326CD74}"/>
-              </a:ext>
-            </a:extLst>
-          </p:cNvPr>
-          <p:cNvSpPr txBox="1"/>
-          <p:nvPr/>
-        </p:nvSpPr>
-        <p:spPr>
-          <a:xfrm>
-            <a:off x="6690804" y="2763320"/>
-            <a:ext cx="1681026" cy="338554"/>
-          </a:xfrm>
-          <a:prstGeom prst="rect">
-            <a:avLst/>
-          </a:prstGeom>
-          <a:noFill/>
-        </p:spPr>
-        <p:txBody>
-          <a:bodyPr wrap="square" rtlCol="0">
-            <a:spAutoFit/>
-          </a:bodyPr>
-          <a:lstStyle/>
-          <a:p>
-            <a:pPr algn="ctr"/>
-            <a:r>
-              <a:rPr lang="en-US" sz="1600" dirty="0"/>
-              <a:t>Comparison</a:t>
-            </a:r>
-          </a:p>
-        </p:txBody>
-      </p:sp>
-      <p:sp>
-        <p:nvSpPr>
-          <p:cNvPr id="114" name="Rectangle 113">
-            <a:extLst>
-              <a:ext uri="{FF2B5EF4-FFF2-40B4-BE49-F238E27FC236}">
-                <a16:creationId xmlns:a16="http://schemas.microsoft.com/office/drawing/2014/main" id="{A78A02CD-9247-091A-D7DF-959E74D540A7}"/>
-              </a:ext>
-            </a:extLst>
-          </p:cNvPr>
-          <p:cNvSpPr/>
-          <p:nvPr/>
-        </p:nvSpPr>
-        <p:spPr>
-          <a:xfrm>
-            <a:off x="8041974" y="3727158"/>
-            <a:ext cx="2059317" cy="690720"/>
+            <a:off x="6946799" y="3573461"/>
+            <a:ext cx="2059317" cy="1065439"/>
           </a:xfrm>
           <a:prstGeom prst="rect">
             <a:avLst/>
@@ -4239,7 +3905,7 @@
             <a:pPr algn="ctr"/>
             <a:r>
               <a:rPr lang="en-US" sz="1600" dirty="0"/>
-              <a:t>[…, </a:t>
+              <a:t>HAPV: […, </a:t>
             </a:r>
             <a:r>
               <a:rPr lang="en-US" sz="1600" b="1" dirty="0"/>
@@ -4277,7 +3943,6 @@
           <p:cNvCxnSpPr>
             <a:cxnSpLocks/>
             <a:stCxn id="31" idx="4"/>
-            <a:endCxn id="68" idx="1"/>
           </p:cNvCxnSpPr>
           <p:nvPr/>
         </p:nvCxnSpPr>
@@ -4333,11 +3998,11 @@
         <p:spPr>
           <a:xfrm>
             <a:off x="2314071" y="5187664"/>
-            <a:ext cx="868382" cy="595258"/>
+            <a:ext cx="539870" cy="595258"/>
           </a:xfrm>
           <a:prstGeom prst="bentConnector3">
             <a:avLst>
-              <a:gd name="adj1" fmla="val 30542"/>
+              <a:gd name="adj1" fmla="val 50000"/>
             </a:avLst>
           </a:prstGeom>
           <a:ln w="38100" cap="flat" cmpd="sng" algn="ctr">
@@ -4377,7 +4042,6 @@
           <p:cNvCxnSpPr>
             <a:cxnSpLocks/>
             <a:stCxn id="29" idx="4"/>
-            <a:endCxn id="6" idx="1"/>
           </p:cNvCxnSpPr>
           <p:nvPr/>
         </p:nvCxnSpPr>
@@ -4433,11 +4097,11 @@
         <p:spPr>
           <a:xfrm>
             <a:off x="2314071" y="2843389"/>
-            <a:ext cx="749113" cy="661827"/>
+            <a:ext cx="557089" cy="661827"/>
           </a:xfrm>
           <a:prstGeom prst="bentConnector3">
             <a:avLst>
-              <a:gd name="adj1" fmla="val 35405"/>
+              <a:gd name="adj1" fmla="val 47923"/>
             </a:avLst>
           </a:prstGeom>
           <a:ln w="38100" cap="flat" cmpd="sng" algn="ctr">
@@ -4465,76 +4129,27 @@
           </a:fontRef>
         </p:style>
       </p:cxnSp>
-      <p:cxnSp>
-        <p:nvCxnSpPr>
-          <p:cNvPr id="38" name="Elbow Connector 37">
-            <a:extLst>
-              <a:ext uri="{FF2B5EF4-FFF2-40B4-BE49-F238E27FC236}">
-                <a16:creationId xmlns:a16="http://schemas.microsoft.com/office/drawing/2014/main" id="{CC9AC7FB-71AC-ACA0-06AC-D576FC5F295D}"/>
-              </a:ext>
-            </a:extLst>
-          </p:cNvPr>
-          <p:cNvCxnSpPr>
-            <a:cxnSpLocks/>
-            <a:stCxn id="18" idx="3"/>
-            <a:endCxn id="87" idx="2"/>
-          </p:cNvCxnSpPr>
+      <p:sp>
+        <p:nvSpPr>
+          <p:cNvPr id="42" name="Decision 41">
+            <a:extLst>
+              <a:ext uri="{FF2B5EF4-FFF2-40B4-BE49-F238E27FC236}">
+                <a16:creationId xmlns:a16="http://schemas.microsoft.com/office/drawing/2014/main" id="{4D660C00-5694-716C-2EC0-B1C407D54ACB}"/>
+              </a:ext>
+            </a:extLst>
+          </p:cNvPr>
+          <p:cNvSpPr/>
           <p:nvPr/>
-        </p:nvCxnSpPr>
+        </p:nvSpPr>
         <p:spPr>
-          <a:xfrm flipV="1">
-            <a:off x="6841005" y="3247642"/>
-            <a:ext cx="690312" cy="257573"/>
+          <a:xfrm>
+            <a:off x="5341738" y="4913721"/>
+            <a:ext cx="1878298" cy="615751"/>
           </a:xfrm>
-          <a:prstGeom prst="bentConnector2">
+          <a:prstGeom prst="flowChartDecision">
             <a:avLst/>
           </a:prstGeom>
-          <a:ln w="38100" cap="flat" cmpd="sng" algn="ctr">
-            <a:solidFill>
-              <a:schemeClr val="dk1"/>
-            </a:solidFill>
-            <a:prstDash val="solid"/>
-            <a:round/>
-            <a:headEnd type="none" w="med" len="med"/>
-            <a:tailEnd type="arrow" w="med" len="med"/>
-          </a:ln>
-        </p:spPr>
-        <p:style>
-          <a:lnRef idx="0">
-            <a:scrgbClr r="0" g="0" b="0"/>
-          </a:lnRef>
-          <a:fillRef idx="0">
-            <a:scrgbClr r="0" g="0" b="0"/>
-          </a:fillRef>
-          <a:effectRef idx="0">
-            <a:scrgbClr r="0" g="0" b="0"/>
-          </a:effectRef>
-          <a:fontRef idx="minor">
-            <a:schemeClr val="tx1"/>
-          </a:fontRef>
-        </p:style>
-      </p:cxnSp>
-      <p:sp>
-        <p:nvSpPr>
-          <p:cNvPr id="17" name="Rectangle 16">
-            <a:extLst>
-              <a:ext uri="{FF2B5EF4-FFF2-40B4-BE49-F238E27FC236}">
-                <a16:creationId xmlns:a16="http://schemas.microsoft.com/office/drawing/2014/main" id="{262336FA-3404-5647-3836-B4570FE48AA0}"/>
-              </a:ext>
-            </a:extLst>
-          </p:cNvPr>
-          <p:cNvSpPr/>
-          <p:nvPr/>
-        </p:nvSpPr>
-        <p:spPr>
-          <a:xfrm>
-            <a:off x="6301135" y="2233261"/>
-            <a:ext cx="545714" cy="287121"/>
-          </a:xfrm>
-          <a:prstGeom prst="rect">
-            <a:avLst/>
-          </a:prstGeom>
-          <a:noFill/>
+          <a:ln w="38100"/>
         </p:spPr>
         <p:style>
           <a:lnRef idx="2">
@@ -4555,100 +4170,95 @@
           <a:lstStyle/>
           <a:p>
             <a:pPr algn="ctr"/>
-            <a:r>
-              <a:rPr lang="en-US" sz="1600" i="1" dirty="0">
-                <a:latin typeface="APPLE CHANCERY" panose="03020702040506060504" pitchFamily="66" charset="-79"/>
-                <a:cs typeface="APPLE CHANCERY" panose="03020702040506060504" pitchFamily="66" charset="-79"/>
-              </a:rPr>
-              <a:t>L</a:t>
-            </a:r>
-            <a:r>
-              <a:rPr lang="en-US" sz="1600" i="1" baseline="-25000" dirty="0"/>
-              <a:t>1_o</a:t>
-            </a:r>
-            <a:endParaRPr lang="en-US" sz="2400" i="1" baseline="-25000" dirty="0"/>
-          </a:p>
-        </p:txBody>
-      </p:sp>
-      <p:sp>
-        <p:nvSpPr>
-          <p:cNvPr id="18" name="Rectangle 17">
-            <a:extLst>
-              <a:ext uri="{FF2B5EF4-FFF2-40B4-BE49-F238E27FC236}">
-                <a16:creationId xmlns:a16="http://schemas.microsoft.com/office/drawing/2014/main" id="{9818F54C-4A0B-5648-AB45-95D664FA38D8}"/>
-              </a:ext>
-            </a:extLst>
-          </p:cNvPr>
-          <p:cNvSpPr/>
+            <a:endParaRPr lang="en-US" sz="1200" dirty="0"/>
+          </a:p>
+        </p:txBody>
+      </p:sp>
+      <p:sp>
+        <p:nvSpPr>
+          <p:cNvPr id="43" name="TextBox 42">
+            <a:extLst>
+              <a:ext uri="{FF2B5EF4-FFF2-40B4-BE49-F238E27FC236}">
+                <a16:creationId xmlns:a16="http://schemas.microsoft.com/office/drawing/2014/main" id="{F8B8E053-E94C-6C19-BC5E-9E30248770DD}"/>
+              </a:ext>
+            </a:extLst>
+          </p:cNvPr>
+          <p:cNvSpPr txBox="1"/>
           <p:nvPr/>
         </p:nvSpPr>
         <p:spPr>
           <a:xfrm>
-            <a:off x="6295291" y="3361654"/>
-            <a:ext cx="545714" cy="287121"/>
+            <a:off x="5608931" y="5053532"/>
+            <a:ext cx="1340579" cy="336128"/>
           </a:xfrm>
           <a:prstGeom prst="rect">
             <a:avLst/>
           </a:prstGeom>
           <a:noFill/>
         </p:spPr>
-        <p:style>
-          <a:lnRef idx="2">
-            <a:schemeClr val="dk1"/>
-          </a:lnRef>
-          <a:fillRef idx="1">
-            <a:schemeClr val="lt1"/>
-          </a:fillRef>
-          <a:effectRef idx="0">
-            <a:schemeClr val="dk1"/>
-          </a:effectRef>
-          <a:fontRef idx="minor">
-            <a:schemeClr val="dk1"/>
-          </a:fontRef>
-        </p:style>
-        <p:txBody>
-          <a:bodyPr rtlCol="0" anchor="ctr"/>
+        <p:txBody>
+          <a:bodyPr wrap="square" rtlCol="0">
+            <a:spAutoFit/>
+          </a:bodyPr>
           <a:lstStyle/>
           <a:p>
             <a:pPr algn="ctr"/>
             <a:r>
-              <a:rPr lang="en-US" sz="1600" i="1" dirty="0">
-                <a:latin typeface="APPLE CHANCERY" panose="03020702040506060504" pitchFamily="66" charset="-79"/>
-                <a:cs typeface="APPLE CHANCERY" panose="03020702040506060504" pitchFamily="66" charset="-79"/>
+              <a:rPr lang="en-US" sz="1600" dirty="0"/>
+              <a:t>ARI(</a:t>
+            </a:r>
+            <a:r>
+              <a:rPr lang="en-US" sz="1600" dirty="0">
+                <a:latin typeface="Apple Chancery" panose="03020702040506060504" pitchFamily="66" charset="-79"/>
+                <a:cs typeface="Apple Chancery" panose="03020702040506060504" pitchFamily="66" charset="-79"/>
               </a:rPr>
-              <a:t>L</a:t>
-            </a:r>
-            <a:r>
-              <a:rPr lang="en-US" sz="1600" i="1" baseline="-25000" dirty="0">
-                <a:latin typeface="APPLE CHANCERY" panose="03020702040506060504" pitchFamily="66" charset="-79"/>
-                <a:cs typeface="APPLE CHANCERY" panose="03020702040506060504" pitchFamily="66" charset="-79"/>
+              <a:t>l</a:t>
+            </a:r>
+            <a:r>
+              <a:rPr lang="en-US" sz="1600" baseline="-25000" dirty="0"/>
+              <a:t>2_o</a:t>
+            </a:r>
+            <a:r>
+              <a:rPr lang="en-US" sz="1600" dirty="0">
+                <a:latin typeface="Apple Chancery" panose="03020702040506060504" pitchFamily="66" charset="-79"/>
+                <a:cs typeface="Apple Chancery" panose="03020702040506060504" pitchFamily="66" charset="-79"/>
               </a:rPr>
-              <a:t>1_k</a:t>
-            </a:r>
-            <a:endParaRPr lang="en-US" sz="2400" i="1" baseline="-25000" dirty="0"/>
+              <a:t>,l</a:t>
+            </a:r>
+            <a:r>
+              <a:rPr lang="en-US" sz="1600" baseline="-25000" dirty="0">
+                <a:latin typeface="Apple Chancery" panose="03020702040506060504" pitchFamily="66" charset="-79"/>
+                <a:cs typeface="Apple Chancery" panose="03020702040506060504" pitchFamily="66" charset="-79"/>
+              </a:rPr>
+              <a:t>2_k</a:t>
+            </a:r>
+            <a:r>
+              <a:rPr lang="en-US" sz="1600" dirty="0"/>
+              <a:t>)</a:t>
+            </a:r>
           </a:p>
         </p:txBody>
       </p:sp>
       <p:cxnSp>
         <p:nvCxnSpPr>
-          <p:cNvPr id="23" name="Elbow Connector 22">
-            <a:extLst>
-              <a:ext uri="{FF2B5EF4-FFF2-40B4-BE49-F238E27FC236}">
-                <a16:creationId xmlns:a16="http://schemas.microsoft.com/office/drawing/2014/main" id="{3AFCEED6-6165-DDB4-9DAF-CF6A2C62507B}"/>
+          <p:cNvPr id="44" name="Elbow Connector 43">
+            <a:extLst>
+              <a:ext uri="{FF2B5EF4-FFF2-40B4-BE49-F238E27FC236}">
+                <a16:creationId xmlns:a16="http://schemas.microsoft.com/office/drawing/2014/main" id="{A2AFD8A9-056F-AA7D-9071-F9A55548C028}"/>
               </a:ext>
             </a:extLst>
           </p:cNvPr>
           <p:cNvCxnSpPr>
             <a:cxnSpLocks/>
-            <a:stCxn id="17" idx="3"/>
-            <a:endCxn id="87" idx="0"/>
+            <a:stCxn id="69" idx="1"/>
+            <a:endCxn id="42" idx="2"/>
           </p:cNvCxnSpPr>
           <p:nvPr/>
         </p:nvCxnSpPr>
         <p:spPr>
-          <a:xfrm>
-            <a:off x="6846849" y="2376822"/>
-            <a:ext cx="684468" cy="255069"/>
+          <a:xfrm flipV="1">
+            <a:off x="5191105" y="5529472"/>
+            <a:ext cx="1089782" cy="253450"/>
           </a:xfrm>
           <a:prstGeom prst="bentConnector2">
             <a:avLst/>
@@ -4680,369 +4290,24 @@
       </p:cxnSp>
       <p:cxnSp>
         <p:nvCxnSpPr>
-          <p:cNvPr id="27" name="Straight Arrow Connector 26">
-            <a:extLst>
-              <a:ext uri="{FF2B5EF4-FFF2-40B4-BE49-F238E27FC236}">
-                <a16:creationId xmlns:a16="http://schemas.microsoft.com/office/drawing/2014/main" id="{748110DA-E422-D65F-2989-92188299C2E8}"/>
+          <p:cNvPr id="47" name="Elbow Connector 46">
+            <a:extLst>
+              <a:ext uri="{FF2B5EF4-FFF2-40B4-BE49-F238E27FC236}">
+                <a16:creationId xmlns:a16="http://schemas.microsoft.com/office/drawing/2014/main" id="{57D35D40-0BDB-B497-7E56-8DBCC0BE381F}"/>
               </a:ext>
             </a:extLst>
           </p:cNvPr>
           <p:cNvCxnSpPr>
             <a:cxnSpLocks/>
-            <a:stCxn id="6" idx="3"/>
-            <a:endCxn id="17" idx="1"/>
-          </p:cNvCxnSpPr>
-          <p:nvPr/>
-        </p:nvCxnSpPr>
-        <p:spPr>
-          <a:xfrm flipV="1">
-            <a:off x="5931873" y="2376822"/>
-            <a:ext cx="369262" cy="3008"/>
-          </a:xfrm>
-          <a:prstGeom prst="straightConnector1">
-            <a:avLst/>
-          </a:prstGeom>
-          <a:ln w="41275" cap="flat" cmpd="sng" algn="ctr">
-            <a:solidFill>
-              <a:schemeClr val="tx1"/>
-            </a:solidFill>
-            <a:prstDash val="solid"/>
-            <a:round/>
-            <a:headEnd type="none" w="med" len="med"/>
-            <a:tailEnd type="arrow" w="med" len="med"/>
-          </a:ln>
-          <a:effectLst/>
-        </p:spPr>
-        <p:style>
-          <a:lnRef idx="2">
-            <a:schemeClr val="accent1"/>
-          </a:lnRef>
-          <a:fillRef idx="0">
-            <a:schemeClr val="accent1"/>
-          </a:fillRef>
-          <a:effectRef idx="1">
-            <a:schemeClr val="accent1"/>
-          </a:effectRef>
-          <a:fontRef idx="minor">
-            <a:schemeClr val="tx1"/>
-          </a:fontRef>
-        </p:style>
-      </p:cxnSp>
-      <p:cxnSp>
-        <p:nvCxnSpPr>
-          <p:cNvPr id="37" name="Straight Arrow Connector 36">
-            <a:extLst>
-              <a:ext uri="{FF2B5EF4-FFF2-40B4-BE49-F238E27FC236}">
-                <a16:creationId xmlns:a16="http://schemas.microsoft.com/office/drawing/2014/main" id="{367F901D-7118-E411-37D1-31DA07B693F2}"/>
-              </a:ext>
-            </a:extLst>
-          </p:cNvPr>
-          <p:cNvCxnSpPr>
-            <a:cxnSpLocks/>
-            <a:stCxn id="54" idx="1"/>
-            <a:endCxn id="18" idx="1"/>
-          </p:cNvCxnSpPr>
-          <p:nvPr/>
-        </p:nvCxnSpPr>
-        <p:spPr>
-          <a:xfrm flipV="1">
-            <a:off x="5802089" y="3505215"/>
-            <a:ext cx="493202" cy="1"/>
-          </a:xfrm>
-          <a:prstGeom prst="straightConnector1">
-            <a:avLst/>
-          </a:prstGeom>
-          <a:ln w="41275" cap="flat" cmpd="sng" algn="ctr">
-            <a:solidFill>
-              <a:schemeClr val="tx1"/>
-            </a:solidFill>
-            <a:prstDash val="solid"/>
-            <a:round/>
-            <a:headEnd type="none" w="med" len="med"/>
-            <a:tailEnd type="arrow" w="med" len="med"/>
-          </a:ln>
-          <a:effectLst/>
-        </p:spPr>
-        <p:style>
-          <a:lnRef idx="2">
-            <a:schemeClr val="accent1"/>
-          </a:lnRef>
-          <a:fillRef idx="0">
-            <a:schemeClr val="accent1"/>
-          </a:fillRef>
-          <a:effectRef idx="1">
-            <a:schemeClr val="accent1"/>
-          </a:effectRef>
-          <a:fontRef idx="minor">
-            <a:schemeClr val="tx1"/>
-          </a:fontRef>
-        </p:style>
-      </p:cxnSp>
-      <p:sp>
-        <p:nvSpPr>
-          <p:cNvPr id="42" name="Decision 41">
-            <a:extLst>
-              <a:ext uri="{FF2B5EF4-FFF2-40B4-BE49-F238E27FC236}">
-                <a16:creationId xmlns:a16="http://schemas.microsoft.com/office/drawing/2014/main" id="{4D660C00-5694-716C-2EC0-B1C407D54ACB}"/>
-              </a:ext>
-            </a:extLst>
-          </p:cNvPr>
-          <p:cNvSpPr/>
-          <p:nvPr/>
-        </p:nvSpPr>
-        <p:spPr>
-          <a:xfrm>
-            <a:off x="6592168" y="4913721"/>
-            <a:ext cx="1878298" cy="615751"/>
-          </a:xfrm>
-          <a:prstGeom prst="flowChartDecision">
-            <a:avLst/>
-          </a:prstGeom>
-          <a:ln w="38100"/>
-        </p:spPr>
-        <p:style>
-          <a:lnRef idx="2">
-            <a:schemeClr val="dk1"/>
-          </a:lnRef>
-          <a:fillRef idx="1">
-            <a:schemeClr val="lt1"/>
-          </a:fillRef>
-          <a:effectRef idx="0">
-            <a:schemeClr val="dk1"/>
-          </a:effectRef>
-          <a:fontRef idx="minor">
-            <a:schemeClr val="dk1"/>
-          </a:fontRef>
-        </p:style>
-        <p:txBody>
-          <a:bodyPr rtlCol="0" anchor="ctr"/>
-          <a:lstStyle/>
-          <a:p>
-            <a:pPr algn="ctr"/>
-            <a:endParaRPr lang="en-US" sz="1200" dirty="0"/>
-          </a:p>
-        </p:txBody>
-      </p:sp>
-      <p:sp>
-        <p:nvSpPr>
-          <p:cNvPr id="43" name="TextBox 42">
-            <a:extLst>
-              <a:ext uri="{FF2B5EF4-FFF2-40B4-BE49-F238E27FC236}">
-                <a16:creationId xmlns:a16="http://schemas.microsoft.com/office/drawing/2014/main" id="{F8B8E053-E94C-6C19-BC5E-9E30248770DD}"/>
-              </a:ext>
-            </a:extLst>
-          </p:cNvPr>
-          <p:cNvSpPr txBox="1"/>
-          <p:nvPr/>
-        </p:nvSpPr>
-        <p:spPr>
-          <a:xfrm>
-            <a:off x="6690804" y="5045150"/>
-            <a:ext cx="1681026" cy="338554"/>
-          </a:xfrm>
-          <a:prstGeom prst="rect">
-            <a:avLst/>
-          </a:prstGeom>
-          <a:noFill/>
-        </p:spPr>
-        <p:txBody>
-          <a:bodyPr wrap="square" rtlCol="0">
-            <a:spAutoFit/>
-          </a:bodyPr>
-          <a:lstStyle/>
-          <a:p>
-            <a:pPr algn="ctr"/>
-            <a:r>
-              <a:rPr lang="en-US" sz="1600" dirty="0"/>
-              <a:t>Comparison</a:t>
-            </a:r>
-          </a:p>
-        </p:txBody>
-      </p:sp>
-      <p:cxnSp>
-        <p:nvCxnSpPr>
-          <p:cNvPr id="44" name="Elbow Connector 43">
-            <a:extLst>
-              <a:ext uri="{FF2B5EF4-FFF2-40B4-BE49-F238E27FC236}">
-                <a16:creationId xmlns:a16="http://schemas.microsoft.com/office/drawing/2014/main" id="{A2AFD8A9-056F-AA7D-9071-F9A55548C028}"/>
-              </a:ext>
-            </a:extLst>
-          </p:cNvPr>
-          <p:cNvCxnSpPr>
-            <a:cxnSpLocks/>
-            <a:stCxn id="46" idx="3"/>
-            <a:endCxn id="42" idx="2"/>
-          </p:cNvCxnSpPr>
-          <p:nvPr/>
-        </p:nvCxnSpPr>
-        <p:spPr>
-          <a:xfrm flipV="1">
-            <a:off x="6835161" y="5529472"/>
-            <a:ext cx="696156" cy="257573"/>
-          </a:xfrm>
-          <a:prstGeom prst="bentConnector2">
-            <a:avLst/>
-          </a:prstGeom>
-          <a:ln w="38100" cap="flat" cmpd="sng" algn="ctr">
-            <a:solidFill>
-              <a:schemeClr val="dk1"/>
-            </a:solidFill>
-            <a:prstDash val="solid"/>
-            <a:round/>
-            <a:headEnd type="none" w="med" len="med"/>
-            <a:tailEnd type="arrow" w="med" len="med"/>
-          </a:ln>
-        </p:spPr>
-        <p:style>
-          <a:lnRef idx="0">
-            <a:scrgbClr r="0" g="0" b="0"/>
-          </a:lnRef>
-          <a:fillRef idx="0">
-            <a:scrgbClr r="0" g="0" b="0"/>
-          </a:fillRef>
-          <a:effectRef idx="0">
-            <a:scrgbClr r="0" g="0" b="0"/>
-          </a:effectRef>
-          <a:fontRef idx="minor">
-            <a:schemeClr val="tx1"/>
-          </a:fontRef>
-        </p:style>
-      </p:cxnSp>
-      <p:sp>
-        <p:nvSpPr>
-          <p:cNvPr id="45" name="Rectangle 44">
-            <a:extLst>
-              <a:ext uri="{FF2B5EF4-FFF2-40B4-BE49-F238E27FC236}">
-                <a16:creationId xmlns:a16="http://schemas.microsoft.com/office/drawing/2014/main" id="{7914E000-3517-22FF-BB7A-6E9AE5404274}"/>
-              </a:ext>
-            </a:extLst>
-          </p:cNvPr>
-          <p:cNvSpPr/>
-          <p:nvPr/>
-        </p:nvSpPr>
-        <p:spPr>
-          <a:xfrm>
-            <a:off x="6301135" y="4515091"/>
-            <a:ext cx="539870" cy="287121"/>
-          </a:xfrm>
-          <a:prstGeom prst="rect">
-            <a:avLst/>
-          </a:prstGeom>
-          <a:noFill/>
-        </p:spPr>
-        <p:style>
-          <a:lnRef idx="2">
-            <a:schemeClr val="dk1"/>
-          </a:lnRef>
-          <a:fillRef idx="1">
-            <a:schemeClr val="lt1"/>
-          </a:fillRef>
-          <a:effectRef idx="0">
-            <a:schemeClr val="dk1"/>
-          </a:effectRef>
-          <a:fontRef idx="minor">
-            <a:schemeClr val="dk1"/>
-          </a:fontRef>
-        </p:style>
-        <p:txBody>
-          <a:bodyPr rtlCol="0" anchor="ctr"/>
-          <a:lstStyle/>
-          <a:p>
-            <a:pPr algn="ctr"/>
-            <a:r>
-              <a:rPr lang="en-US" sz="1600" i="1" dirty="0">
-                <a:latin typeface="APPLE CHANCERY" panose="03020702040506060504" pitchFamily="66" charset="-79"/>
-                <a:cs typeface="APPLE CHANCERY" panose="03020702040506060504" pitchFamily="66" charset="-79"/>
-              </a:rPr>
-              <a:t>L</a:t>
-            </a:r>
-            <a:r>
-              <a:rPr lang="en-US" sz="1600" i="1" baseline="-25000" dirty="0"/>
-              <a:t>2_o</a:t>
-            </a:r>
-            <a:endParaRPr lang="en-US" sz="2400" i="1" baseline="-25000" dirty="0"/>
-          </a:p>
-        </p:txBody>
-      </p:sp>
-      <p:sp>
-        <p:nvSpPr>
-          <p:cNvPr id="46" name="Rectangle 45">
-            <a:extLst>
-              <a:ext uri="{FF2B5EF4-FFF2-40B4-BE49-F238E27FC236}">
-                <a16:creationId xmlns:a16="http://schemas.microsoft.com/office/drawing/2014/main" id="{7CE6FF87-FE42-BE80-E77F-C4A661E8F1A6}"/>
-              </a:ext>
-            </a:extLst>
-          </p:cNvPr>
-          <p:cNvSpPr/>
-          <p:nvPr/>
-        </p:nvSpPr>
-        <p:spPr>
-          <a:xfrm>
-            <a:off x="6295291" y="5643484"/>
-            <a:ext cx="539870" cy="287121"/>
-          </a:xfrm>
-          <a:prstGeom prst="rect">
-            <a:avLst/>
-          </a:prstGeom>
-          <a:noFill/>
-        </p:spPr>
-        <p:style>
-          <a:lnRef idx="2">
-            <a:schemeClr val="dk1"/>
-          </a:lnRef>
-          <a:fillRef idx="1">
-            <a:schemeClr val="lt1"/>
-          </a:fillRef>
-          <a:effectRef idx="0">
-            <a:schemeClr val="dk1"/>
-          </a:effectRef>
-          <a:fontRef idx="minor">
-            <a:schemeClr val="dk1"/>
-          </a:fontRef>
-        </p:style>
-        <p:txBody>
-          <a:bodyPr rtlCol="0" anchor="ctr"/>
-          <a:lstStyle/>
-          <a:p>
-            <a:pPr algn="ctr"/>
-            <a:r>
-              <a:rPr lang="en-US" sz="1600" i="1" dirty="0">
-                <a:latin typeface="APPLE CHANCERY" panose="03020702040506060504" pitchFamily="66" charset="-79"/>
-                <a:cs typeface="APPLE CHANCERY" panose="03020702040506060504" pitchFamily="66" charset="-79"/>
-              </a:rPr>
-              <a:t>L</a:t>
-            </a:r>
-            <a:r>
-              <a:rPr lang="en-US" sz="1600" i="1" baseline="-25000" dirty="0">
-                <a:latin typeface="APPLE CHANCERY" panose="03020702040506060504" pitchFamily="66" charset="-79"/>
-                <a:cs typeface="APPLE CHANCERY" panose="03020702040506060504" pitchFamily="66" charset="-79"/>
-              </a:rPr>
-              <a:t>2_k</a:t>
-            </a:r>
-            <a:endParaRPr lang="en-US" sz="2400" i="1" baseline="-25000" dirty="0"/>
-          </a:p>
-        </p:txBody>
-      </p:sp>
-      <p:cxnSp>
-        <p:nvCxnSpPr>
-          <p:cNvPr id="47" name="Elbow Connector 46">
-            <a:extLst>
-              <a:ext uri="{FF2B5EF4-FFF2-40B4-BE49-F238E27FC236}">
-                <a16:creationId xmlns:a16="http://schemas.microsoft.com/office/drawing/2014/main" id="{57D35D40-0BDB-B497-7E56-8DBCC0BE381F}"/>
-              </a:ext>
-            </a:extLst>
-          </p:cNvPr>
-          <p:cNvCxnSpPr>
-            <a:cxnSpLocks/>
-            <a:stCxn id="45" idx="3"/>
+            <a:stCxn id="66" idx="1"/>
             <a:endCxn id="42" idx="0"/>
           </p:cNvCxnSpPr>
           <p:nvPr/>
         </p:nvCxnSpPr>
         <p:spPr>
           <a:xfrm>
-            <a:off x="6841005" y="4658652"/>
-            <a:ext cx="690312" cy="255069"/>
+            <a:off x="5173884" y="4659368"/>
+            <a:ext cx="1107003" cy="254353"/>
           </a:xfrm>
           <a:prstGeom prst="bentConnector2">
             <a:avLst/>
@@ -5074,131 +4339,344 @@
       </p:cxnSp>
       <p:cxnSp>
         <p:nvCxnSpPr>
-          <p:cNvPr id="48" name="Straight Arrow Connector 47">
-            <a:extLst>
-              <a:ext uri="{FF2B5EF4-FFF2-40B4-BE49-F238E27FC236}">
-                <a16:creationId xmlns:a16="http://schemas.microsoft.com/office/drawing/2014/main" id="{AF18D928-3BDB-EE6B-F484-FBE9086B40F9}"/>
+          <p:cNvPr id="52" name="Elbow Connector 51">
+            <a:extLst>
+              <a:ext uri="{FF2B5EF4-FFF2-40B4-BE49-F238E27FC236}">
+                <a16:creationId xmlns:a16="http://schemas.microsoft.com/office/drawing/2014/main" id="{9A35004C-8811-DF56-D5FA-E25F62731B41}"/>
               </a:ext>
             </a:extLst>
           </p:cNvPr>
           <p:cNvCxnSpPr>
             <a:cxnSpLocks/>
-            <a:stCxn id="68" idx="3"/>
-            <a:endCxn id="45" idx="1"/>
+            <a:stCxn id="50" idx="3"/>
+            <a:endCxn id="114" idx="0"/>
           </p:cNvCxnSpPr>
           <p:nvPr/>
         </p:nvCxnSpPr>
         <p:spPr>
           <a:xfrm>
-            <a:off x="5931873" y="4657536"/>
-            <a:ext cx="369262" cy="1116"/>
+            <a:off x="7251662" y="2943891"/>
+            <a:ext cx="724796" cy="629570"/>
           </a:xfrm>
-          <a:prstGeom prst="straightConnector1">
+          <a:prstGeom prst="bentConnector2">
             <a:avLst/>
           </a:prstGeom>
-          <a:ln w="41275" cap="flat" cmpd="sng" algn="ctr">
+          <a:ln w="38100" cap="flat" cmpd="sng" algn="ctr">
             <a:solidFill>
-              <a:schemeClr val="tx1"/>
+              <a:schemeClr val="dk1"/>
             </a:solidFill>
             <a:prstDash val="solid"/>
             <a:round/>
             <a:headEnd type="none" w="med" len="med"/>
             <a:tailEnd type="arrow" w="med" len="med"/>
           </a:ln>
-          <a:effectLst/>
         </p:spPr>
         <p:style>
-          <a:lnRef idx="2">
-            <a:schemeClr val="accent1"/>
+          <a:lnRef idx="0">
+            <a:scrgbClr r="0" g="0" b="0"/>
           </a:lnRef>
           <a:fillRef idx="0">
-            <a:schemeClr val="accent1"/>
+            <a:scrgbClr r="0" g="0" b="0"/>
           </a:fillRef>
-          <a:effectRef idx="1">
-            <a:schemeClr val="accent1"/>
+          <a:effectRef idx="0">
+            <a:scrgbClr r="0" g="0" b="0"/>
           </a:effectRef>
           <a:fontRef idx="minor">
             <a:schemeClr val="tx1"/>
           </a:fontRef>
         </p:style>
       </p:cxnSp>
+      <p:sp>
+        <p:nvSpPr>
+          <p:cNvPr id="13" name="Oval 12">
+            <a:extLst>
+              <a:ext uri="{FF2B5EF4-FFF2-40B4-BE49-F238E27FC236}">
+                <a16:creationId xmlns:a16="http://schemas.microsoft.com/office/drawing/2014/main" id="{2D7FAC3F-1A6F-84D6-8FAA-E9457B1CCC50}"/>
+              </a:ext>
+            </a:extLst>
+          </p:cNvPr>
+          <p:cNvSpPr/>
+          <p:nvPr/>
+        </p:nvSpPr>
+        <p:spPr>
+          <a:xfrm>
+            <a:off x="2094193" y="5462556"/>
+            <a:ext cx="86952" cy="86952"/>
+          </a:xfrm>
+          <a:prstGeom prst="ellipse">
+            <a:avLst/>
+          </a:prstGeom>
+          <a:solidFill>
+            <a:schemeClr val="tx1"/>
+          </a:solidFill>
+          <a:ln>
+            <a:noFill/>
+          </a:ln>
+        </p:spPr>
+        <p:style>
+          <a:lnRef idx="2">
+            <a:schemeClr val="dk1">
+              <a:shade val="15000"/>
+            </a:schemeClr>
+          </a:lnRef>
+          <a:fillRef idx="1">
+            <a:schemeClr val="dk1"/>
+          </a:fillRef>
+          <a:effectRef idx="0">
+            <a:schemeClr val="dk1"/>
+          </a:effectRef>
+          <a:fontRef idx="minor">
+            <a:schemeClr val="lt1"/>
+          </a:fontRef>
+        </p:style>
+        <p:txBody>
+          <a:bodyPr rtlCol="0" anchor="ctr"/>
+          <a:lstStyle/>
+          <a:p>
+            <a:pPr algn="ctr"/>
+            <a:endParaRPr lang="en-US"/>
+          </a:p>
+        </p:txBody>
+      </p:sp>
+      <p:sp>
+        <p:nvSpPr>
+          <p:cNvPr id="39" name="Card 38">
+            <a:extLst>
+              <a:ext uri="{FF2B5EF4-FFF2-40B4-BE49-F238E27FC236}">
+                <a16:creationId xmlns:a16="http://schemas.microsoft.com/office/drawing/2014/main" id="{6879D311-2117-6055-AD9C-DBA821CB39F4}"/>
+              </a:ext>
+            </a:extLst>
+          </p:cNvPr>
+          <p:cNvSpPr/>
+          <p:nvPr/>
+        </p:nvSpPr>
+        <p:spPr>
+          <a:xfrm flipH="1">
+            <a:off x="2862218" y="1658053"/>
+            <a:ext cx="2319943" cy="1443821"/>
+          </a:xfrm>
+          <a:prstGeom prst="flowChartPunchedCard">
+            <a:avLst/>
+          </a:prstGeom>
+          <a:solidFill>
+            <a:schemeClr val="bg1"/>
+          </a:solidFill>
+          <a:ln w="41275">
+            <a:solidFill>
+              <a:schemeClr val="tx1"/>
+            </a:solidFill>
+          </a:ln>
+          <a:effectLst/>
+        </p:spPr>
+        <p:style>
+          <a:lnRef idx="1">
+            <a:schemeClr val="accent1"/>
+          </a:lnRef>
+          <a:fillRef idx="3">
+            <a:schemeClr val="accent1"/>
+          </a:fillRef>
+          <a:effectRef idx="2">
+            <a:schemeClr val="accent1"/>
+          </a:effectRef>
+          <a:fontRef idx="minor">
+            <a:schemeClr val="lt1"/>
+          </a:fontRef>
+        </p:style>
+        <p:txBody>
+          <a:bodyPr rtlCol="0" anchor="ctr"/>
+          <a:lstStyle/>
+          <a:p>
+            <a:pPr algn="ctr"/>
+            <a:r>
+              <a:rPr lang="en-US" sz="2000" dirty="0">
+                <a:solidFill>
+                  <a:schemeClr val="tx1"/>
+                </a:solidFill>
+              </a:rPr>
+              <a:t>Original </a:t>
+            </a:r>
+          </a:p>
+          <a:p>
+            <a:pPr algn="ctr"/>
+            <a:r>
+              <a:rPr lang="en-US" sz="2000" dirty="0">
+                <a:solidFill>
+                  <a:schemeClr val="tx1"/>
+                </a:solidFill>
+              </a:rPr>
+              <a:t> Implementation</a:t>
+            </a:r>
+          </a:p>
+          <a:p>
+            <a:pPr algn="ctr"/>
+            <a:r>
+              <a:rPr lang="en-US" sz="1600" dirty="0">
+                <a:solidFill>
+                  <a:schemeClr val="tx1"/>
+                </a:solidFill>
+              </a:rPr>
+              <a:t>Parameters: […, </a:t>
+            </a:r>
+            <a:r>
+              <a:rPr lang="en-US" sz="1600" b="1" dirty="0" err="1">
+                <a:solidFill>
+                  <a:schemeClr val="tx1"/>
+                </a:solidFill>
+              </a:rPr>
+              <a:t>algorithm:ball_tree</a:t>
+            </a:r>
+            <a:r>
+              <a:rPr lang="en-US" sz="1600" dirty="0">
+                <a:solidFill>
+                  <a:schemeClr val="tx1"/>
+                </a:solidFill>
+              </a:rPr>
+              <a:t>, …]</a:t>
+            </a:r>
+          </a:p>
+          <a:p>
+            <a:pPr algn="ctr"/>
+            <a:endParaRPr lang="en-US" sz="2000" dirty="0">
+              <a:solidFill>
+                <a:schemeClr val="tx1"/>
+              </a:solidFill>
+            </a:endParaRPr>
+          </a:p>
+        </p:txBody>
+      </p:sp>
+      <p:sp>
+        <p:nvSpPr>
+          <p:cNvPr id="50" name="Decision 49">
+            <a:extLst>
+              <a:ext uri="{FF2B5EF4-FFF2-40B4-BE49-F238E27FC236}">
+                <a16:creationId xmlns:a16="http://schemas.microsoft.com/office/drawing/2014/main" id="{FF511416-4C89-6A90-DCF9-B30969C93C62}"/>
+              </a:ext>
+            </a:extLst>
+          </p:cNvPr>
+          <p:cNvSpPr/>
+          <p:nvPr/>
+        </p:nvSpPr>
+        <p:spPr>
+          <a:xfrm>
+            <a:off x="5373364" y="2636015"/>
+            <a:ext cx="1878298" cy="615751"/>
+          </a:xfrm>
+          <a:prstGeom prst="flowChartDecision">
+            <a:avLst/>
+          </a:prstGeom>
+          <a:ln w="38100"/>
+        </p:spPr>
+        <p:style>
+          <a:lnRef idx="2">
+            <a:schemeClr val="dk1"/>
+          </a:lnRef>
+          <a:fillRef idx="1">
+            <a:schemeClr val="lt1"/>
+          </a:fillRef>
+          <a:effectRef idx="0">
+            <a:schemeClr val="dk1"/>
+          </a:effectRef>
+          <a:fontRef idx="minor">
+            <a:schemeClr val="dk1"/>
+          </a:fontRef>
+        </p:style>
+        <p:txBody>
+          <a:bodyPr rtlCol="0" anchor="ctr"/>
+          <a:lstStyle/>
+          <a:p>
+            <a:pPr algn="ctr"/>
+            <a:endParaRPr lang="en-US" sz="1200" dirty="0"/>
+          </a:p>
+        </p:txBody>
+      </p:sp>
+      <p:sp>
+        <p:nvSpPr>
+          <p:cNvPr id="51" name="TextBox 50">
+            <a:extLst>
+              <a:ext uri="{FF2B5EF4-FFF2-40B4-BE49-F238E27FC236}">
+                <a16:creationId xmlns:a16="http://schemas.microsoft.com/office/drawing/2014/main" id="{EC5C37B7-81E0-CB8C-8C50-3CEB1E7BA46C}"/>
+              </a:ext>
+            </a:extLst>
+          </p:cNvPr>
+          <p:cNvSpPr txBox="1"/>
+          <p:nvPr/>
+        </p:nvSpPr>
+        <p:spPr>
+          <a:xfrm>
+            <a:off x="5640557" y="2775826"/>
+            <a:ext cx="1340579" cy="336128"/>
+          </a:xfrm>
+          <a:prstGeom prst="rect">
+            <a:avLst/>
+          </a:prstGeom>
+          <a:noFill/>
+        </p:spPr>
+        <p:txBody>
+          <a:bodyPr wrap="square" rtlCol="0">
+            <a:spAutoFit/>
+          </a:bodyPr>
+          <a:lstStyle/>
+          <a:p>
+            <a:pPr algn="ctr"/>
+            <a:r>
+              <a:rPr lang="en-US" sz="1600" dirty="0"/>
+              <a:t>ARI(</a:t>
+            </a:r>
+            <a:r>
+              <a:rPr lang="en-US" sz="1600" dirty="0">
+                <a:latin typeface="Apple Chancery" panose="03020702040506060504" pitchFamily="66" charset="-79"/>
+                <a:cs typeface="Apple Chancery" panose="03020702040506060504" pitchFamily="66" charset="-79"/>
+              </a:rPr>
+              <a:t>l</a:t>
+            </a:r>
+            <a:r>
+              <a:rPr lang="en-US" sz="1600" baseline="-25000" dirty="0"/>
+              <a:t>2_o</a:t>
+            </a:r>
+            <a:r>
+              <a:rPr lang="en-US" sz="1600" dirty="0">
+                <a:latin typeface="Apple Chancery" panose="03020702040506060504" pitchFamily="66" charset="-79"/>
+                <a:cs typeface="Apple Chancery" panose="03020702040506060504" pitchFamily="66" charset="-79"/>
+              </a:rPr>
+              <a:t>,l</a:t>
+            </a:r>
+            <a:r>
+              <a:rPr lang="en-US" sz="1600" baseline="-25000" dirty="0">
+                <a:latin typeface="Apple Chancery" panose="03020702040506060504" pitchFamily="66" charset="-79"/>
+                <a:cs typeface="Apple Chancery" panose="03020702040506060504" pitchFamily="66" charset="-79"/>
+              </a:rPr>
+              <a:t>2_k</a:t>
+            </a:r>
+            <a:r>
+              <a:rPr lang="en-US" sz="1600" dirty="0"/>
+              <a:t>)</a:t>
+            </a:r>
+          </a:p>
+        </p:txBody>
+      </p:sp>
       <p:cxnSp>
         <p:nvCxnSpPr>
-          <p:cNvPr id="49" name="Straight Arrow Connector 48">
-            <a:extLst>
-              <a:ext uri="{FF2B5EF4-FFF2-40B4-BE49-F238E27FC236}">
-                <a16:creationId xmlns:a16="http://schemas.microsoft.com/office/drawing/2014/main" id="{29B420A3-8250-72BD-2DB2-03E8450BD8CA}"/>
+          <p:cNvPr id="53" name="Elbow Connector 52">
+            <a:extLst>
+              <a:ext uri="{FF2B5EF4-FFF2-40B4-BE49-F238E27FC236}">
+                <a16:creationId xmlns:a16="http://schemas.microsoft.com/office/drawing/2014/main" id="{95E7A18C-77DA-0567-B18C-378BEF0B969D}"/>
               </a:ext>
             </a:extLst>
           </p:cNvPr>
           <p:cNvCxnSpPr>
             <a:cxnSpLocks/>
-            <a:stCxn id="69" idx="1"/>
-            <a:endCxn id="46" idx="1"/>
+            <a:stCxn id="54" idx="1"/>
+            <a:endCxn id="50" idx="2"/>
           </p:cNvCxnSpPr>
           <p:nvPr/>
         </p:nvCxnSpPr>
         <p:spPr>
-          <a:xfrm>
-            <a:off x="5802089" y="5782922"/>
-            <a:ext cx="493202" cy="4123"/>
+          <a:xfrm flipV="1">
+            <a:off x="5191104" y="3251766"/>
+            <a:ext cx="1121409" cy="253450"/>
           </a:xfrm>
-          <a:prstGeom prst="straightConnector1">
+          <a:prstGeom prst="bentConnector2">
             <a:avLst/>
-          </a:prstGeom>
-          <a:ln w="41275" cap="flat" cmpd="sng" algn="ctr">
-            <a:solidFill>
-              <a:schemeClr val="tx1"/>
-            </a:solidFill>
-            <a:prstDash val="solid"/>
-            <a:round/>
-            <a:headEnd type="none" w="med" len="med"/>
-            <a:tailEnd type="arrow" w="med" len="med"/>
-          </a:ln>
-          <a:effectLst/>
-        </p:spPr>
-        <p:style>
-          <a:lnRef idx="2">
-            <a:schemeClr val="accent1"/>
-          </a:lnRef>
-          <a:fillRef idx="0">
-            <a:schemeClr val="accent1"/>
-          </a:fillRef>
-          <a:effectRef idx="1">
-            <a:schemeClr val="accent1"/>
-          </a:effectRef>
-          <a:fontRef idx="minor">
-            <a:schemeClr val="tx1"/>
-          </a:fontRef>
-        </p:style>
-      </p:cxnSp>
-      <p:cxnSp>
-        <p:nvCxnSpPr>
-          <p:cNvPr id="52" name="Elbow Connector 51">
-            <a:extLst>
-              <a:ext uri="{FF2B5EF4-FFF2-40B4-BE49-F238E27FC236}">
-                <a16:creationId xmlns:a16="http://schemas.microsoft.com/office/drawing/2014/main" id="{9A35004C-8811-DF56-D5FA-E25F62731B41}"/>
-              </a:ext>
-            </a:extLst>
-          </p:cNvPr>
-          <p:cNvCxnSpPr>
-            <a:cxnSpLocks/>
-            <a:stCxn id="96" idx="3"/>
-            <a:endCxn id="114" idx="1"/>
-          </p:cNvCxnSpPr>
-          <p:nvPr/>
-        </p:nvCxnSpPr>
-        <p:spPr>
-          <a:xfrm flipH="1">
-            <a:off x="8041974" y="2932597"/>
-            <a:ext cx="329856" cy="1139921"/>
-          </a:xfrm>
-          <a:prstGeom prst="bentConnector5">
-            <a:avLst>
-              <a:gd name="adj1" fmla="val -69303"/>
-              <a:gd name="adj2" fmla="val 42277"/>
-              <a:gd name="adj3" fmla="val 169303"/>
-            </a:avLst>
           </a:prstGeom>
           <a:ln w="38100" cap="flat" cmpd="sng" algn="ctr">
             <a:solidFill>
@@ -5227,31 +4705,76 @@
       </p:cxnSp>
       <p:cxnSp>
         <p:nvCxnSpPr>
-          <p:cNvPr id="56" name="Elbow Connector 55">
-            <a:extLst>
-              <a:ext uri="{FF2B5EF4-FFF2-40B4-BE49-F238E27FC236}">
-                <a16:creationId xmlns:a16="http://schemas.microsoft.com/office/drawing/2014/main" id="{556B4951-1D51-52AF-93D1-40CD41D405F2}"/>
+          <p:cNvPr id="55" name="Elbow Connector 54">
+            <a:extLst>
+              <a:ext uri="{FF2B5EF4-FFF2-40B4-BE49-F238E27FC236}">
+                <a16:creationId xmlns:a16="http://schemas.microsoft.com/office/drawing/2014/main" id="{42624D75-3E0A-1080-2B50-5422232C24C3}"/>
               </a:ext>
             </a:extLst>
           </p:cNvPr>
           <p:cNvCxnSpPr>
             <a:cxnSpLocks/>
-            <a:stCxn id="43" idx="3"/>
-            <a:endCxn id="114" idx="1"/>
+            <a:stCxn id="39" idx="1"/>
+            <a:endCxn id="50" idx="0"/>
           </p:cNvCxnSpPr>
           <p:nvPr/>
         </p:nvCxnSpPr>
         <p:spPr>
-          <a:xfrm flipH="1" flipV="1">
-            <a:off x="8041974" y="4072518"/>
-            <a:ext cx="329856" cy="1141909"/>
+          <a:xfrm>
+            <a:off x="5182161" y="2379964"/>
+            <a:ext cx="1130352" cy="256051"/>
           </a:xfrm>
-          <a:prstGeom prst="bentConnector5">
-            <a:avLst>
-              <a:gd name="adj1" fmla="val -69303"/>
-              <a:gd name="adj2" fmla="val 42290"/>
-              <a:gd name="adj3" fmla="val 169303"/>
-            </a:avLst>
+          <a:prstGeom prst="bentConnector2">
+            <a:avLst/>
+          </a:prstGeom>
+          <a:ln w="38100" cap="flat" cmpd="sng" algn="ctr">
+            <a:solidFill>
+              <a:schemeClr val="dk1"/>
+            </a:solidFill>
+            <a:prstDash val="solid"/>
+            <a:round/>
+            <a:headEnd type="none" w="med" len="med"/>
+            <a:tailEnd type="arrow" w="med" len="med"/>
+          </a:ln>
+        </p:spPr>
+        <p:style>
+          <a:lnRef idx="0">
+            <a:scrgbClr r="0" g="0" b="0"/>
+          </a:lnRef>
+          <a:fillRef idx="0">
+            <a:scrgbClr r="0" g="0" b="0"/>
+          </a:fillRef>
+          <a:effectRef idx="0">
+            <a:scrgbClr r="0" g="0" b="0"/>
+          </a:effectRef>
+          <a:fontRef idx="minor">
+            <a:schemeClr val="tx1"/>
+          </a:fontRef>
+        </p:style>
+      </p:cxnSp>
+      <p:cxnSp>
+        <p:nvCxnSpPr>
+          <p:cNvPr id="62" name="Elbow Connector 61">
+            <a:extLst>
+              <a:ext uri="{FF2B5EF4-FFF2-40B4-BE49-F238E27FC236}">
+                <a16:creationId xmlns:a16="http://schemas.microsoft.com/office/drawing/2014/main" id="{61DDB72E-CD50-1266-E099-69A80C4042B8}"/>
+              </a:ext>
+            </a:extLst>
+          </p:cNvPr>
+          <p:cNvCxnSpPr>
+            <a:cxnSpLocks/>
+            <a:stCxn id="42" idx="3"/>
+            <a:endCxn id="114" idx="2"/>
+          </p:cNvCxnSpPr>
+          <p:nvPr/>
+        </p:nvCxnSpPr>
+        <p:spPr>
+          <a:xfrm flipV="1">
+            <a:off x="7220036" y="4638900"/>
+            <a:ext cx="756422" cy="582697"/>
+          </a:xfrm>
+          <a:prstGeom prst="bentConnector2">
+            <a:avLst/>
           </a:prstGeom>
           <a:ln w="38100" cap="flat" cmpd="sng" algn="ctr">
             <a:solidFill>

</xml_diff>